<commit_message>
Update the example apache cookbook
To fully use the helpers you still need to add the it_behave_like

Signed-off-by: Franklin Webber <franklin@chef.io>
</commit_message>
<xml_diff>
--- a/09-creating_a_ruby_gem.pptx
+++ b/09-creating_a_ruby_gem.pptx
@@ -1237,11 +1237,7 @@
           <a:p>
             <a:r>
               <a:rPr lang="en-US" b="1" dirty="0" smtClean="0"/>
-              <a:t>Note</a:t>
-            </a:r>
-            <a:r>
-              <a:rPr lang="en-US" b="1" dirty="0" smtClean="0"/>
-              <a:t>:</a:t>
+              <a:t>Note:</a:t>
             </a:r>
             <a:r>
               <a:rPr lang="en-US" dirty="0" smtClean="0"/>
@@ -3963,19 +3959,7 @@
           <a:p>
             <a:r>
               <a:rPr lang="en-US" dirty="0" smtClean="0"/>
-              <a:t>Note: Ruby gems provid</a:t>
-            </a:r>
-            <a:r>
-              <a:rPr lang="en-US" dirty="0" smtClean="0"/>
-              <a:t>e classes that you can require into your own Ruby code so it is very close to the concept of a "</a:t>
-            </a:r>
-            <a:r>
-              <a:rPr lang="en-US" dirty="0" smtClean="0"/>
-              <a:t>library cookbook": a cookbook that contains helper methods and custom resources</a:t>
-            </a:r>
-            <a:r>
-              <a:rPr lang="en-US" dirty="0" smtClean="0"/>
-              <a:t> that you employ in your cookbooks.</a:t>
+              <a:t>Note: Ruby gems provide classes that you can require into your own Ruby code so it is very close to the concept of a "library cookbook": a cookbook that contains helper methods and custom resources that you employ in your cookbooks.</a:t>
             </a:r>
             <a:endParaRPr lang="en-US" dirty="0"/>
           </a:p>
@@ -4576,11 +4560,7 @@
           <a:p>
             <a:r>
               <a:rPr lang="en-US" dirty="0" smtClean="0"/>
-              <a:t>Now it is time to demonstrate how we can create a Ruby gem, migrate the code we have written to the new gem, and then load this new gem into our current cookboo</a:t>
-            </a:r>
-            <a:r>
-              <a:rPr lang="en-US" dirty="0" smtClean="0"/>
-              <a:t>k and future cookbooks that want to employ the helpers.</a:t>
+              <a:t>Now it is time to demonstrate how we can create a Ruby gem, migrate the code we have written to the new gem, and then load this new gem into our current cookbook and future cookbooks that want to employ the helpers.</a:t>
             </a:r>
             <a:endParaRPr lang="en-US" dirty="0"/>
           </a:p>
@@ -5504,14 +5484,14 @@
           </a:ln>
           <a:extLst>
             <a:ext uri="{909E8E84-426E-40dd-AFC4-6F175D3DCCD1}">
-              <a14:hiddenFill xmlns="" xmlns:a14="http://schemas.microsoft.com/office/drawing/2010/main">
+              <a14:hiddenFill xmlns:a14="http://schemas.microsoft.com/office/drawing/2010/main" xmlns="">
                 <a:solidFill>
                   <a:srgbClr val="FFFFFF"/>
                 </a:solidFill>
               </a14:hiddenFill>
             </a:ext>
             <a:ext uri="{91240B29-F687-4f45-9708-019B960494DF}">
-              <a14:hiddenLine xmlns="" xmlns:a14="http://schemas.microsoft.com/office/drawing/2010/main" w="9525">
+              <a14:hiddenLine xmlns:a14="http://schemas.microsoft.com/office/drawing/2010/main" xmlns="" w="9525">
                 <a:solidFill>
                   <a:srgbClr val="000000"/>
                 </a:solidFill>
@@ -5659,14 +5639,14 @@
           </a:ln>
           <a:extLst>
             <a:ext uri="{909E8E84-426E-40dd-AFC4-6F175D3DCCD1}">
-              <a14:hiddenFill xmlns="" xmlns:a14="http://schemas.microsoft.com/office/drawing/2010/main">
+              <a14:hiddenFill xmlns:a14="http://schemas.microsoft.com/office/drawing/2010/main" xmlns="">
                 <a:solidFill>
                   <a:srgbClr val="FFFFFF"/>
                 </a:solidFill>
               </a14:hiddenFill>
             </a:ext>
             <a:ext uri="{91240B29-F687-4f45-9708-019B960494DF}">
-              <a14:hiddenLine xmlns="" xmlns:a14="http://schemas.microsoft.com/office/drawing/2010/main" w="9525">
+              <a14:hiddenLine xmlns:a14="http://schemas.microsoft.com/office/drawing/2010/main" xmlns="" w="9525">
                 <a:solidFill>
                   <a:srgbClr val="000000"/>
                 </a:solidFill>
@@ -6157,14 +6137,14 @@
           </a:ln>
           <a:extLst>
             <a:ext uri="{909E8E84-426E-40dd-AFC4-6F175D3DCCD1}">
-              <a14:hiddenFill xmlns="" xmlns:a14="http://schemas.microsoft.com/office/drawing/2010/main">
+              <a14:hiddenFill xmlns:a14="http://schemas.microsoft.com/office/drawing/2010/main" xmlns="">
                 <a:solidFill>
                   <a:srgbClr val="FFFFFF"/>
                 </a:solidFill>
               </a14:hiddenFill>
             </a:ext>
             <a:ext uri="{91240B29-F687-4f45-9708-019B960494DF}">
-              <a14:hiddenLine xmlns="" xmlns:a14="http://schemas.microsoft.com/office/drawing/2010/main" w="9525">
+              <a14:hiddenLine xmlns:a14="http://schemas.microsoft.com/office/drawing/2010/main" xmlns="" w="9525">
                 <a:solidFill>
                   <a:srgbClr val="000000"/>
                 </a:solidFill>
@@ -7630,14 +7610,14 @@
           </a:ln>
           <a:extLst>
             <a:ext uri="{909E8E84-426E-40dd-AFC4-6F175D3DCCD1}">
-              <a14:hiddenFill xmlns="" xmlns:a14="http://schemas.microsoft.com/office/drawing/2010/main">
+              <a14:hiddenFill xmlns:a14="http://schemas.microsoft.com/office/drawing/2010/main" xmlns="">
                 <a:solidFill>
                   <a:srgbClr val="FFFFFF"/>
                 </a:solidFill>
               </a14:hiddenFill>
             </a:ext>
             <a:ext uri="{91240B29-F687-4f45-9708-019B960494DF}">
-              <a14:hiddenLine xmlns="" xmlns:a14="http://schemas.microsoft.com/office/drawing/2010/main" w="9525">
+              <a14:hiddenLine xmlns:a14="http://schemas.microsoft.com/office/drawing/2010/main" xmlns="" w="9525">
                 <a:solidFill>
                   <a:srgbClr val="000000"/>
                 </a:solidFill>
@@ -9257,14 +9237,14 @@
           </a:ln>
           <a:extLst>
             <a:ext uri="{909E8E84-426E-40dd-AFC4-6F175D3DCCD1}">
-              <a14:hiddenFill xmlns="" xmlns:a14="http://schemas.microsoft.com/office/drawing/2010/main">
+              <a14:hiddenFill xmlns:a14="http://schemas.microsoft.com/office/drawing/2010/main" xmlns="">
                 <a:solidFill>
                   <a:srgbClr val="FFFFFF"/>
                 </a:solidFill>
               </a14:hiddenFill>
             </a:ext>
             <a:ext uri="{91240B29-F687-4f45-9708-019B960494DF}">
-              <a14:hiddenLine xmlns="" xmlns:a14="http://schemas.microsoft.com/office/drawing/2010/main" w="9525">
+              <a14:hiddenLine xmlns:a14="http://schemas.microsoft.com/office/drawing/2010/main" xmlns="" w="9525">
                 <a:solidFill>
                   <a:srgbClr val="000000"/>
                 </a:solidFill>
@@ -9822,14 +9802,14 @@
           </a:ln>
           <a:extLst>
             <a:ext uri="{909E8E84-426E-40dd-AFC4-6F175D3DCCD1}">
-              <a14:hiddenFill xmlns="" xmlns:a14="http://schemas.microsoft.com/office/drawing/2010/main">
+              <a14:hiddenFill xmlns:a14="http://schemas.microsoft.com/office/drawing/2010/main" xmlns="">
                 <a:solidFill>
                   <a:srgbClr val="FFFFFF"/>
                 </a:solidFill>
               </a14:hiddenFill>
             </a:ext>
             <a:ext uri="{91240B29-F687-4f45-9708-019B960494DF}">
-              <a14:hiddenLine xmlns="" xmlns:a14="http://schemas.microsoft.com/office/drawing/2010/main" w="9525">
+              <a14:hiddenLine xmlns:a14="http://schemas.microsoft.com/office/drawing/2010/main" xmlns="" w="9525">
                 <a:solidFill>
                   <a:srgbClr val="000000"/>
                 </a:solidFill>
@@ -10396,14 +10376,14 @@
           </a:ln>
           <a:extLst>
             <a:ext uri="{909E8E84-426E-40dd-AFC4-6F175D3DCCD1}">
-              <a14:hiddenFill xmlns="" xmlns:a14="http://schemas.microsoft.com/office/drawing/2010/main">
+              <a14:hiddenFill xmlns:a14="http://schemas.microsoft.com/office/drawing/2010/main" xmlns="">
                 <a:solidFill>
                   <a:srgbClr val="FFFFFF"/>
                 </a:solidFill>
               </a14:hiddenFill>
             </a:ext>
             <a:ext uri="{91240B29-F687-4f45-9708-019B960494DF}">
-              <a14:hiddenLine xmlns="" xmlns:a14="http://schemas.microsoft.com/office/drawing/2010/main" w="9525">
+              <a14:hiddenLine xmlns:a14="http://schemas.microsoft.com/office/drawing/2010/main" xmlns="" w="9525">
                 <a:solidFill>
                   <a:srgbClr val="000000"/>
                 </a:solidFill>
@@ -11055,14 +11035,14 @@
           </a:ln>
           <a:extLst>
             <a:ext uri="{909E8E84-426E-40dd-AFC4-6F175D3DCCD1}">
-              <a14:hiddenFill xmlns="" xmlns:a14="http://schemas.microsoft.com/office/drawing/2010/main">
+              <a14:hiddenFill xmlns:a14="http://schemas.microsoft.com/office/drawing/2010/main" xmlns="">
                 <a:solidFill>
                   <a:srgbClr val="FFFFFF"/>
                 </a:solidFill>
               </a14:hiddenFill>
             </a:ext>
             <a:ext uri="{91240B29-F687-4f45-9708-019B960494DF}">
-              <a14:hiddenLine xmlns="" xmlns:a14="http://schemas.microsoft.com/office/drawing/2010/main" w="9525">
+              <a14:hiddenLine xmlns:a14="http://schemas.microsoft.com/office/drawing/2010/main" xmlns="" w="9525">
                 <a:solidFill>
                   <a:srgbClr val="000000"/>
                 </a:solidFill>
@@ -11847,14 +11827,14 @@
           </a:ln>
           <a:extLst>
             <a:ext uri="{909E8E84-426E-40dd-AFC4-6F175D3DCCD1}">
-              <a14:hiddenFill xmlns="" xmlns:a14="http://schemas.microsoft.com/office/drawing/2010/main">
+              <a14:hiddenFill xmlns:a14="http://schemas.microsoft.com/office/drawing/2010/main" xmlns="">
                 <a:solidFill>
                   <a:srgbClr val="FFFFFF"/>
                 </a:solidFill>
               </a14:hiddenFill>
             </a:ext>
             <a:ext uri="{91240B29-F687-4f45-9708-019B960494DF}">
-              <a14:hiddenLine xmlns="" xmlns:a14="http://schemas.microsoft.com/office/drawing/2010/main" w="9525">
+              <a14:hiddenLine xmlns:a14="http://schemas.microsoft.com/office/drawing/2010/main" xmlns="" w="9525">
                 <a:solidFill>
                   <a:srgbClr val="000000"/>
                 </a:solidFill>
@@ -12765,14 +12745,14 @@
           </a:ln>
           <a:extLst>
             <a:ext uri="{909E8E84-426E-40dd-AFC4-6F175D3DCCD1}">
-              <a14:hiddenFill xmlns="" xmlns:a14="http://schemas.microsoft.com/office/drawing/2010/main">
+              <a14:hiddenFill xmlns:a14="http://schemas.microsoft.com/office/drawing/2010/main" xmlns="">
                 <a:solidFill>
                   <a:srgbClr val="FFFFFF"/>
                 </a:solidFill>
               </a14:hiddenFill>
             </a:ext>
             <a:ext uri="{91240B29-F687-4f45-9708-019B960494DF}">
-              <a14:hiddenLine xmlns="" xmlns:a14="http://schemas.microsoft.com/office/drawing/2010/main" w="9525">
+              <a14:hiddenLine xmlns:a14="http://schemas.microsoft.com/office/drawing/2010/main" xmlns="" w="9525">
                 <a:solidFill>
                   <a:srgbClr val="000000"/>
                 </a:solidFill>
@@ -17023,7 +17003,9 @@
         </p:nvSpPr>
         <p:spPr/>
         <p:txBody>
-          <a:bodyPr/>
+          <a:bodyPr>
+            <a:normAutofit fontScale="92500" lnSpcReduction="10000"/>
+          </a:bodyPr>
           <a:lstStyle/>
           <a:p>
             <a:r>
@@ -17110,10 +17092,18 @@
             </a:r>
             <a:r>
               <a:rPr lang="en-US" dirty="0" smtClean="0"/>
-              <a:t>   end</a:t>
-            </a:r>
-          </a:p>
-          <a:p>
+              <a:t>   </a:t>
+            </a:r>
+            <a:r>
+              <a:rPr lang="en-US" dirty="0" smtClean="0"/>
+              <a:t>end</a:t>
+            </a:r>
+          </a:p>
+          <a:p>
+            <a:r>
+              <a:rPr lang="en-US" dirty="0"/>
+              <a:t>	</a:t>
+            </a:r>
             <a:endParaRPr lang="en-US" dirty="0"/>
           </a:p>
           <a:p>
@@ -17135,9 +17125,12 @@
             </a:r>
             <a:r>
               <a:rPr lang="en-US" dirty="0" smtClean="0"/>
-              <a:t> ] }</a:t>
-            </a:r>
-            <a:endParaRPr lang="en-US" dirty="0"/>
+              <a:t> ] </a:t>
+            </a:r>
+            <a:r>
+              <a:rPr lang="en-US" dirty="0" smtClean="0"/>
+              <a:t>}</a:t>
+            </a:r>
           </a:p>
           <a:p>
             <a:r>
@@ -17146,6 +17139,27 @@
             </a:r>
             <a:r>
               <a:rPr lang="en-US" dirty="0" smtClean="0"/>
+              <a:t>   </a:t>
+            </a:r>
+            <a:r>
+              <a:rPr lang="en-US" dirty="0" err="1"/>
+              <a:t>it_behaves_like</a:t>
+            </a:r>
+            <a:r>
+              <a:rPr lang="en-US" dirty="0"/>
+              <a:t> 'installs packages'</a:t>
+            </a:r>
+          </a:p>
+          <a:p>
+            <a:endParaRPr lang="en-US" dirty="0"/>
+          </a:p>
+          <a:p>
+            <a:r>
+              <a:rPr lang="en-US" dirty="0"/>
+              <a:t> </a:t>
+            </a:r>
+            <a:r>
+              <a:rPr lang="en-US" dirty="0" smtClean="0"/>
               <a:t> end</a:t>
             </a:r>
           </a:p>
@@ -17197,8 +17211,8 @@
         </p:nvSpPr>
         <p:spPr>
           <a:xfrm>
-            <a:off x="1135042" y="3111336"/>
-            <a:ext cx="14404273" cy="1140030"/>
+            <a:off x="1135042" y="3028208"/>
+            <a:ext cx="14404273" cy="902524"/>
           </a:xfrm>
         </p:spPr>
         <p:txBody>
@@ -17221,8 +17235,8 @@
         </p:nvSpPr>
         <p:spPr>
           <a:xfrm>
-            <a:off x="1135042" y="6305796"/>
-            <a:ext cx="14404273" cy="591787"/>
+            <a:off x="1135042" y="5652656"/>
+            <a:ext cx="14404273" cy="1244928"/>
           </a:xfrm>
         </p:spPr>
         <p:txBody>

</xml_diff>